<commit_message>
ability to have column footers now present
</commit_message>
<xml_diff>
--- a/pptx_tables/test2.pptx
+++ b/pptx_tables/test2.pptx
@@ -3137,15 +3137,17 @@
         <a:graphic>
           <a:graphicData uri="http://schemas.openxmlformats.org/drawingml/2006/table">
             <a:tbl>
-              <a:tblPr firstRow="1" bandRow="1">
+              <a:tblPr bandRow="1" firstCol="1" lastCol="1">
                 <a:tableStyleId>{5C22544A-7EE6-4342-B048-85BDC9FD1C3A}</a:tableStyleId>
               </a:tblPr>
               <a:tblGrid>
-                <a:gridCol w="1524000"/>
-                <a:gridCol w="1524000"/>
-                <a:gridCol w="1524000"/>
+                <a:gridCol w="914400"/>
+                <a:gridCol w="914400"/>
+                <a:gridCol w="914400"/>
+                <a:gridCol w="914400"/>
+                <a:gridCol w="914400"/>
               </a:tblGrid>
-              <a:tr h="457200">
+              <a:tr h="609600">
                 <a:tc>
                   <a:txBody>
                     <a:bodyPr/>
@@ -3159,7 +3161,129 @@
                       </a:r>
                     </a:p>
                   </a:txBody>
-                  <a:tcPr/>
+                  <a:tcPr marT="0" anchor="t"/>
+                </a:tc>
+                <a:tc>
+                  <a:txBody>
+                    <a:bodyPr/>
+                    <a:lstStyle/>
+                    <a:p>
+                      <a:pPr algn="ctr">
+                        <a:defRPr sz="800"/>
+                      </a:pPr>
+                      <a:r>
+                        <a:t>2</a:t>
+                      </a:r>
+                    </a:p>
+                  </a:txBody>
+                  <a:tcPr marT="0" anchor="t"/>
+                </a:tc>
+                <a:tc>
+                  <a:txBody>
+                    <a:bodyPr/>
+                    <a:lstStyle/>
+                    <a:p>
+                      <a:pPr algn="ctr">
+                        <a:defRPr sz="800"/>
+                      </a:pPr>
+                      <a:r>
+                        <a:t>5</a:t>
+                      </a:r>
+                    </a:p>
+                  </a:txBody>
+                  <a:tcPr marT="0" anchor="t"/>
+                </a:tc>
+                <a:tc>
+                  <a:txBody>
+                    <a:bodyPr/>
+                    <a:lstStyle/>
+                    <a:p>
+                      <a:pPr algn="ctr">
+                        <a:defRPr sz="800"/>
+                      </a:pPr>
+                      <a:r>
+                        <a:t>8</a:t>
+                      </a:r>
+                    </a:p>
+                  </a:txBody>
+                  <a:tcPr marT="0" anchor="t"/>
+                </a:tc>
+                <a:tc>
+                  <a:txBody>
+                    <a:bodyPr/>
+                    <a:lstStyle/>
+                    <a:p>
+                      <a:pPr algn="ctr">
+                        <a:defRPr sz="800"/>
+                      </a:pPr>
+                      <a:r>
+                        <a:t>Pears</a:t>
+                      </a:r>
+                    </a:p>
+                  </a:txBody>
+                  <a:tcPr marT="0" anchor="t"/>
+                </a:tc>
+              </a:tr>
+              <a:tr h="609600">
+                <a:tc>
+                  <a:txBody>
+                    <a:bodyPr/>
+                    <a:lstStyle/>
+                    <a:p>
+                      <a:pPr algn="ctr">
+                        <a:defRPr sz="800"/>
+                      </a:pPr>
+                      <a:r>
+                        <a:t>Bananas</a:t>
+                      </a:r>
+                    </a:p>
+                  </a:txBody>
+                  <a:tcPr marT="0" anchor="t"/>
+                </a:tc>
+                <a:tc>
+                  <a:txBody>
+                    <a:bodyPr/>
+                    <a:lstStyle/>
+                    <a:p>
+                      <a:pPr algn="ctr">
+                        <a:defRPr sz="800"/>
+                      </a:pPr>
+                      <a:r>
+                        <a:t>1</a:t>
+                      </a:r>
+                    </a:p>
+                  </a:txBody>
+                  <a:tcPr marT="0" anchor="t"/>
+                </a:tc>
+                <a:tc>
+                  <a:txBody>
+                    <a:bodyPr/>
+                    <a:lstStyle/>
+                    <a:p>
+                      <a:pPr algn="ctr">
+                        <a:defRPr sz="800"/>
+                      </a:pPr>
+                      <a:r>
+                        <a:t>4</a:t>
+                      </a:r>
+                    </a:p>
+                  </a:txBody>
+                  <a:tcPr marT="0" anchor="t"/>
+                </a:tc>
+                <a:tc>
+                  <a:txBody>
+                    <a:bodyPr/>
+                    <a:lstStyle/>
+                    <a:p>
+                      <a:pPr algn="ctr">
+                        <a:defRPr sz="800"/>
+                      </a:pPr>
+                      <a:r>
+                        <a:t>7</a:t>
+                      </a:r>
+                    </a:p>
+                  </a:txBody>
+                  <a:tcPr marT="0" anchor="t"/>
                 </a:tc>
                 <a:tc>
                   <a:txBody>
@@ -3174,7 +3298,69 @@
                       </a:r>
                     </a:p>
                   </a:txBody>
-                  <a:tcPr/>
+                  <a:tcPr marT="0" anchor="t"/>
+                </a:tc>
+              </a:tr>
+              <a:tr h="609600">
+                <a:tc>
+                  <a:txBody>
+                    <a:bodyPr/>
+                    <a:lstStyle/>
+                    <a:p>
+                      <a:pPr algn="ctr">
+                        <a:defRPr sz="800"/>
+                      </a:pPr>
+                      <a:r>
+                        <a:t>Apples</a:t>
+                      </a:r>
+                    </a:p>
+                  </a:txBody>
+                  <a:tcPr marT="0" anchor="t"/>
+                </a:tc>
+                <a:tc>
+                  <a:txBody>
+                    <a:bodyPr/>
+                    <a:lstStyle/>
+                    <a:p>
+                      <a:pPr algn="ctr">
+                        <a:defRPr sz="800"/>
+                      </a:pPr>
+                      <a:r>
+                        <a:t>0</a:t>
+                      </a:r>
+                    </a:p>
+                  </a:txBody>
+                  <a:tcPr marT="0" anchor="t"/>
+                </a:tc>
+                <a:tc>
+                  <a:txBody>
+                    <a:bodyPr/>
+                    <a:lstStyle/>
+                    <a:p>
+                      <a:pPr algn="ctr">
+                        <a:defRPr sz="800"/>
+                      </a:pPr>
+                      <a:r>
+                        <a:t>3</a:t>
+                      </a:r>
+                    </a:p>
+                  </a:txBody>
+                  <a:tcPr marT="0" anchor="t"/>
+                </a:tc>
+                <a:tc>
+                  <a:txBody>
+                    <a:bodyPr/>
+                    <a:lstStyle/>
+                    <a:p>
+                      <a:pPr algn="ctr">
+                        <a:defRPr sz="800"/>
+                      </a:pPr>
+                      <a:r>
+                        <a:t>6</a:t>
+                      </a:r>
+                    </a:p>
+                  </a:txBody>
+                  <a:tcPr marT="0" anchor="t"/>
                 </a:tc>
                 <a:tc>
                   <a:txBody>
@@ -3189,148 +3375,7 @@
                       </a:r>
                     </a:p>
                   </a:txBody>
-                  <a:tcPr/>
-                </a:tc>
-              </a:tr>
-              <a:tr h="457200">
-                <a:tc>
-                  <a:txBody>
-                    <a:bodyPr/>
-                    <a:lstStyle/>
-                    <a:p>
-                      <a:pPr algn="ctr">
-                        <a:defRPr sz="800"/>
-                      </a:pPr>
-                      <a:r>
-                        <a:t>8</a:t>
-                      </a:r>
-                    </a:p>
-                  </a:txBody>
-                  <a:tcPr/>
-                </a:tc>
-                <a:tc>
-                  <a:txBody>
-                    <a:bodyPr/>
-                    <a:lstStyle/>
-                    <a:p>
-                      <a:pPr algn="ctr">
-                        <a:defRPr sz="800"/>
-                      </a:pPr>
-                      <a:r>
-                        <a:t>7</a:t>
-                      </a:r>
-                    </a:p>
-                  </a:txBody>
-                  <a:tcPr/>
-                </a:tc>
-                <a:tc>
-                  <a:txBody>
-                    <a:bodyPr/>
-                    <a:lstStyle/>
-                    <a:p>
-                      <a:pPr algn="ctr">
-                        <a:defRPr sz="800"/>
-                      </a:pPr>
-                      <a:r>
-                        <a:t>6</a:t>
-                      </a:r>
-                    </a:p>
-                  </a:txBody>
-                  <a:tcPr/>
-                </a:tc>
-              </a:tr>
-              <a:tr h="457200">
-                <a:tc>
-                  <a:txBody>
-                    <a:bodyPr/>
-                    <a:lstStyle/>
-                    <a:p>
-                      <a:pPr algn="ctr">
-                        <a:defRPr sz="800"/>
-                      </a:pPr>
-                      <a:r>
-                        <a:t>5</a:t>
-                      </a:r>
-                    </a:p>
-                  </a:txBody>
-                  <a:tcPr/>
-                </a:tc>
-                <a:tc>
-                  <a:txBody>
-                    <a:bodyPr/>
-                    <a:lstStyle/>
-                    <a:p>
-                      <a:pPr algn="ctr">
-                        <a:defRPr sz="800"/>
-                      </a:pPr>
-                      <a:r>
-                        <a:t>4</a:t>
-                      </a:r>
-                    </a:p>
-                  </a:txBody>
-                  <a:tcPr/>
-                </a:tc>
-                <a:tc>
-                  <a:txBody>
-                    <a:bodyPr/>
-                    <a:lstStyle/>
-                    <a:p>
-                      <a:pPr algn="ctr">
-                        <a:defRPr sz="800"/>
-                      </a:pPr>
-                      <a:r>
-                        <a:t>3</a:t>
-                      </a:r>
-                    </a:p>
-                  </a:txBody>
-                  <a:tcPr/>
-                </a:tc>
-              </a:tr>
-              <a:tr h="457200">
-                <a:tc>
-                  <a:txBody>
-                    <a:bodyPr/>
-                    <a:lstStyle/>
-                    <a:p>
-                      <a:pPr algn="ctr">
-                        <a:defRPr sz="800"/>
-                      </a:pPr>
-                      <a:r>
-                        <a:t>2</a:t>
-                      </a:r>
-                    </a:p>
-                  </a:txBody>
-                  <a:tcPr/>
-                </a:tc>
-                <a:tc>
-                  <a:txBody>
-                    <a:bodyPr/>
-                    <a:lstStyle/>
-                    <a:p>
-                      <a:pPr algn="ctr">
-                        <a:defRPr sz="800"/>
-                      </a:pPr>
-                      <a:r>
-                        <a:t>1</a:t>
-                      </a:r>
-                    </a:p>
-                  </a:txBody>
-                  <a:tcPr/>
-                </a:tc>
-                <a:tc>
-                  <a:txBody>
-                    <a:bodyPr/>
-                    <a:lstStyle/>
-                    <a:p>
-                      <a:pPr algn="ctr">
-                        <a:defRPr sz="800"/>
-                      </a:pPr>
-                      <a:r>
-                        <a:t>0</a:t>
-                      </a:r>
-                    </a:p>
-                  </a:txBody>
-                  <a:tcPr/>
+                  <a:tcPr marT="0" anchor="t"/>
                 </a:tc>
               </a:tr>
             </a:tbl>

</xml_diff>

<commit_message>
removed 0 margin from top of cell
</commit_message>
<xml_diff>
--- a/pptx_tables/test2.pptx
+++ b/pptx_tables/test2.pptx
@@ -3150,7 +3150,9 @@
               <a:tr h="609600">
                 <a:tc>
                   <a:txBody>
-                    <a:bodyPr/>
+                    <a:bodyPr>
+                      <a:normAutofit/>
+                    </a:bodyPr>
                     <a:lstStyle/>
                     <a:p>
                       <a:pPr algn="ctr">
@@ -3165,7 +3167,9 @@
                 </a:tc>
                 <a:tc>
                   <a:txBody>
-                    <a:bodyPr/>
+                    <a:bodyPr>
+                      <a:normAutofit/>
+                    </a:bodyPr>
                     <a:lstStyle/>
                     <a:p>
                       <a:pPr algn="ctr">
@@ -3180,7 +3184,9 @@
                 </a:tc>
                 <a:tc>
                   <a:txBody>
-                    <a:bodyPr/>
+                    <a:bodyPr>
+                      <a:normAutofit/>
+                    </a:bodyPr>
                     <a:lstStyle/>
                     <a:p>
                       <a:pPr algn="ctr">
@@ -3195,7 +3201,9 @@
                 </a:tc>
                 <a:tc>
                   <a:txBody>
-                    <a:bodyPr/>
+                    <a:bodyPr>
+                      <a:normAutofit/>
+                    </a:bodyPr>
                     <a:lstStyle/>
                     <a:p>
                       <a:pPr algn="ctr">
@@ -3210,7 +3218,9 @@
                 </a:tc>
                 <a:tc>
                   <a:txBody>
-                    <a:bodyPr/>
+                    <a:bodyPr>
+                      <a:normAutofit/>
+                    </a:bodyPr>
                     <a:lstStyle/>
                     <a:p>
                       <a:pPr algn="ctr">
@@ -3227,7 +3237,9 @@
               <a:tr h="609600">
                 <a:tc>
                   <a:txBody>
-                    <a:bodyPr/>
+                    <a:bodyPr>
+                      <a:normAutofit/>
+                    </a:bodyPr>
                     <a:lstStyle/>
                     <a:p>
                       <a:pPr algn="ctr">
@@ -3242,14 +3254,16 @@
                 </a:tc>
                 <a:tc>
                   <a:txBody>
-                    <a:bodyPr/>
+                    <a:bodyPr>
+                      <a:normAutofit/>
+                    </a:bodyPr>
                     <a:lstStyle/>
                     <a:p>
                       <a:pPr algn="ctr">
                         <a:defRPr sz="800"/>
                       </a:pPr>
                       <a:r>
-                        <a:t>1</a:t>
+                        <a:t>this is a whole lot of text and should be too much, yes? asd;fjals;kdfj;laksjdf;lkajsdkl;fjal;ksdjflk;ajsd;lfjalksdjf;lkajsdl;kfj</a:t>
                       </a:r>
                     </a:p>
                   </a:txBody>
@@ -3257,7 +3271,9 @@
                 </a:tc>
                 <a:tc>
                   <a:txBody>
-                    <a:bodyPr/>
+                    <a:bodyPr>
+                      <a:normAutofit/>
+                    </a:bodyPr>
                     <a:lstStyle/>
                     <a:p>
                       <a:pPr algn="ctr">
@@ -3272,7 +3288,9 @@
                 </a:tc>
                 <a:tc>
                   <a:txBody>
-                    <a:bodyPr/>
+                    <a:bodyPr>
+                      <a:normAutofit/>
+                    </a:bodyPr>
                     <a:lstStyle/>
                     <a:p>
                       <a:pPr algn="ctr">
@@ -3287,7 +3305,9 @@
                 </a:tc>
                 <a:tc>
                   <a:txBody>
-                    <a:bodyPr/>
+                    <a:bodyPr>
+                      <a:normAutofit/>
+                    </a:bodyPr>
                     <a:lstStyle/>
                     <a:p>
                       <a:pPr algn="ctr">
@@ -3304,7 +3324,9 @@
               <a:tr h="609600">
                 <a:tc>
                   <a:txBody>
-                    <a:bodyPr/>
+                    <a:bodyPr>
+                      <a:normAutofit/>
+                    </a:bodyPr>
                     <a:lstStyle/>
                     <a:p>
                       <a:pPr algn="ctr">
@@ -3319,22 +3341,23 @@
                 </a:tc>
                 <a:tc>
                   <a:txBody>
-                    <a:bodyPr/>
+                    <a:bodyPr>
+                      <a:normAutofit/>
+                    </a:bodyPr>
                     <a:lstStyle/>
                     <a:p>
                       <a:pPr algn="ctr">
                         <a:defRPr sz="800"/>
                       </a:pPr>
-                      <a:r>
-                        <a:t>0</a:t>
-                      </a:r>
                     </a:p>
                   </a:txBody>
                   <a:tcPr marT="0" anchor="t"/>
                 </a:tc>
                 <a:tc>
                   <a:txBody>
-                    <a:bodyPr/>
+                    <a:bodyPr>
+                      <a:normAutofit/>
+                    </a:bodyPr>
                     <a:lstStyle/>
                     <a:p>
                       <a:pPr algn="ctr">
@@ -3349,7 +3372,9 @@
                 </a:tc>
                 <a:tc>
                   <a:txBody>
-                    <a:bodyPr/>
+                    <a:bodyPr>
+                      <a:normAutofit/>
+                    </a:bodyPr>
                     <a:lstStyle/>
                     <a:p>
                       <a:pPr algn="ctr">
@@ -3364,7 +3389,9 @@
                 </a:tc>
                 <a:tc>
                   <a:txBody>
-                    <a:bodyPr/>
+                    <a:bodyPr>
+                      <a:normAutofit/>
+                    </a:bodyPr>
                     <a:lstStyle/>
                     <a:p>
                       <a:pPr algn="ctr">

</xml_diff>